<commit_message>
Atualização da apresentação da aula 1
</commit_message>
<xml_diff>
--- a/material/OP_aula1.pptx
+++ b/material/OP_aula1.pptx
@@ -5,14 +5,15 @@
     <p:sldMasterId id="2147483648" r:id="rId1"/>
   </p:sldMasterIdLst>
   <p:notesMasterIdLst>
-    <p:notesMasterId r:id="rId7"/>
+    <p:notesMasterId r:id="rId8"/>
   </p:notesMasterIdLst>
   <p:sldIdLst>
     <p:sldId id="256" r:id="rId2"/>
-    <p:sldId id="280" r:id="rId3"/>
-    <p:sldId id="281" r:id="rId4"/>
-    <p:sldId id="282" r:id="rId5"/>
-    <p:sldId id="283" r:id="rId6"/>
+    <p:sldId id="284" r:id="rId3"/>
+    <p:sldId id="280" r:id="rId4"/>
+    <p:sldId id="281" r:id="rId5"/>
+    <p:sldId id="282" r:id="rId6"/>
+    <p:sldId id="283" r:id="rId7"/>
   </p:sldIdLst>
   <p:sldSz cx="9144000" cy="6858000" type="screen4x3"/>
   <p:notesSz cx="6858000" cy="9144000"/>
@@ -632,7 +633,7 @@
             <a:fld id="{75E4FB35-7FF2-4DC3-9DEC-FC88F591C5AB}" type="slidenum">
               <a:rPr lang="en-US" altLang="pt-BR"/>
               <a:pPr/>
-              <a:t>‹#›</a:t>
+              <a:t>‹nº›</a:t>
             </a:fld>
             <a:endParaRPr lang="en-US" altLang="pt-BR"/>
           </a:p>
@@ -1289,7 +1290,7 @@
             <a:lvl1pPr>
               <a:defRPr>
                 <a:solidFill>
-                  <a:srgbClr val="C00000"/>
+                  <a:schemeClr val="bg1"/>
                 </a:solidFill>
               </a:defRPr>
             </a:lvl1pPr>
@@ -1326,35 +1327,35 @@
             <a:lvl1pPr>
               <a:defRPr>
                 <a:solidFill>
-                  <a:srgbClr val="C00000"/>
+                  <a:schemeClr val="bg1"/>
                 </a:solidFill>
               </a:defRPr>
             </a:lvl1pPr>
             <a:lvl2pPr>
               <a:defRPr>
                 <a:solidFill>
-                  <a:srgbClr val="C00000"/>
+                  <a:schemeClr val="bg1"/>
                 </a:solidFill>
               </a:defRPr>
             </a:lvl2pPr>
             <a:lvl3pPr>
               <a:defRPr>
                 <a:solidFill>
-                  <a:srgbClr val="C00000"/>
+                  <a:schemeClr val="bg1"/>
                 </a:solidFill>
               </a:defRPr>
             </a:lvl3pPr>
             <a:lvl4pPr>
               <a:defRPr>
                 <a:solidFill>
-                  <a:srgbClr val="C00000"/>
+                  <a:schemeClr val="bg1"/>
                 </a:solidFill>
               </a:defRPr>
             </a:lvl4pPr>
             <a:lvl5pPr>
               <a:defRPr>
                 <a:solidFill>
-                  <a:srgbClr val="C00000"/>
+                  <a:schemeClr val="bg1"/>
                 </a:solidFill>
               </a:defRPr>
             </a:lvl5pPr>
@@ -3323,6 +3324,131 @@
       </p:grpSpPr>
       <p:sp>
         <p:nvSpPr>
+          <p:cNvPr id="2" name="Título 1">
+            <a:extLst>
+              <a:ext uri="{FF2B5EF4-FFF2-40B4-BE49-F238E27FC236}">
+                <a16:creationId xmlns:a16="http://schemas.microsoft.com/office/drawing/2014/main" id="{FAB2FF30-3D98-4E9C-B422-14D7F6B00773}"/>
+              </a:ext>
+            </a:extLst>
+          </p:cNvPr>
+          <p:cNvSpPr>
+            <a:spLocks noGrp="1"/>
+          </p:cNvSpPr>
+          <p:nvPr>
+            <p:ph type="title"/>
+          </p:nvPr>
+        </p:nvSpPr>
+        <p:spPr/>
+        <p:txBody>
+          <a:bodyPr/>
+          <a:lstStyle/>
+          <a:p>
+            <a:r>
+              <a:rPr lang="pt-BR" dirty="0"/>
+              <a:t>COMBINADOS</a:t>
+            </a:r>
+          </a:p>
+        </p:txBody>
+      </p:sp>
+      <p:sp>
+        <p:nvSpPr>
+          <p:cNvPr id="3" name="Espaço Reservado para Conteúdo 2">
+            <a:extLst>
+              <a:ext uri="{FF2B5EF4-FFF2-40B4-BE49-F238E27FC236}">
+                <a16:creationId xmlns:a16="http://schemas.microsoft.com/office/drawing/2014/main" id="{CFED1DE8-DE66-418B-8087-4D75F0174567}"/>
+              </a:ext>
+            </a:extLst>
+          </p:cNvPr>
+          <p:cNvSpPr>
+            <a:spLocks noGrp="1"/>
+          </p:cNvSpPr>
+          <p:nvPr>
+            <p:ph idx="1"/>
+          </p:nvPr>
+        </p:nvSpPr>
+        <p:spPr>
+          <a:xfrm>
+            <a:off x="107504" y="1087233"/>
+            <a:ext cx="7315200" cy="4572000"/>
+          </a:xfrm>
+        </p:spPr>
+        <p:txBody>
+          <a:bodyPr/>
+          <a:lstStyle/>
+          <a:p>
+            <a:r>
+              <a:rPr lang="pt-BR" dirty="0">
+                <a:solidFill>
+                  <a:srgbClr val="FFFF00"/>
+                </a:solidFill>
+              </a:rPr>
+              <a:t>QUANDO O INSTRUTOR ESTIVER FALANDO OS ALUNOS DEVEM FICAR QUIETOS</a:t>
+            </a:r>
+          </a:p>
+          <a:p>
+            <a:r>
+              <a:rPr lang="pt-BR" dirty="0">
+                <a:solidFill>
+                  <a:srgbClr val="FFFF00"/>
+                </a:solidFill>
+              </a:rPr>
+              <a:t>CONVERSAS PARALELAS ATRAPALHAM A TURMA</a:t>
+            </a:r>
+          </a:p>
+          <a:p>
+            <a:r>
+              <a:rPr lang="pt-BR" dirty="0">
+                <a:solidFill>
+                  <a:srgbClr val="FFFF00"/>
+                </a:solidFill>
+              </a:rPr>
+              <a:t>SE PERSISTIR A CONVERSA SERÁ PEDIDO PARA O ALUNO SE RETIRAR DA SALA</a:t>
+            </a:r>
+          </a:p>
+          <a:p>
+            <a:r>
+              <a:rPr lang="pt-BR" dirty="0">
+                <a:solidFill>
+                  <a:srgbClr val="FFFF00"/>
+                </a:solidFill>
+              </a:rPr>
+              <a:t>SE ISSO SE REPETIR O ALUNO SERÁ CONVIDADO A SE DESLIGAR DA OFICINA</a:t>
+            </a:r>
+          </a:p>
+        </p:txBody>
+      </p:sp>
+    </p:spTree>
+    <p:extLst>
+      <p:ext uri="{BB962C8B-B14F-4D97-AF65-F5344CB8AC3E}">
+        <p14:creationId xmlns:p14="http://schemas.microsoft.com/office/powerpoint/2010/main" val="2821912879"/>
+      </p:ext>
+    </p:extLst>
+  </p:cSld>
+  <p:clrMapOvr>
+    <a:masterClrMapping/>
+  </p:clrMapOvr>
+</p:sld>
+</file>
+
+<file path=ppt/slides/slide3.xml><?xml version="1.0" encoding="utf-8"?>
+<p:sld xmlns:a="http://schemas.openxmlformats.org/drawingml/2006/main" xmlns:r="http://schemas.openxmlformats.org/officeDocument/2006/relationships" xmlns:p="http://schemas.openxmlformats.org/presentationml/2006/main">
+  <p:cSld>
+    <p:spTree>
+      <p:nvGrpSpPr>
+        <p:cNvPr id="1" name=""/>
+        <p:cNvGrpSpPr/>
+        <p:nvPr/>
+      </p:nvGrpSpPr>
+      <p:grpSpPr>
+        <a:xfrm>
+          <a:off x="0" y="0"/>
+          <a:ext cx="0" cy="0"/>
+          <a:chOff x="0" y="0"/>
+          <a:chExt cx="0" cy="0"/>
+        </a:xfrm>
+      </p:grpSpPr>
+      <p:sp>
+        <p:nvSpPr>
           <p:cNvPr id="4" name="Rectangle 4">
             <a:extLst>
               <a:ext uri="{FF2B5EF4-FFF2-40B4-BE49-F238E27FC236}">
@@ -3355,18 +3481,10 @@
               </a:lnSpc>
             </a:pPr>
             <a:r>
-              <a:rPr lang="en-US" altLang="pt-BR" sz="3400" dirty="0">
-                <a:solidFill>
-                  <a:srgbClr val="C00000"/>
-                </a:solidFill>
-              </a:rPr>
+              <a:rPr lang="en-US" altLang="pt-BR" sz="3400" dirty="0"/>
               <a:t>O QUE É COMPUTAÇÃO</a:t>
             </a:r>
-            <a:endParaRPr lang="ru-RU" altLang="pt-BR" sz="3400" dirty="0">
-              <a:solidFill>
-                <a:srgbClr val="C00000"/>
-              </a:solidFill>
-            </a:endParaRPr>
+            <a:endParaRPr lang="ru-RU" altLang="pt-BR" sz="3400" dirty="0"/>
           </a:p>
         </p:txBody>
       </p:sp>
@@ -3716,59 +3834,31 @@
           </a:lstStyle>
           <a:p>
             <a:r>
-              <a:rPr lang="pt-BR" sz="2800" dirty="0">
-                <a:solidFill>
-                  <a:srgbClr val="C00000"/>
-                </a:solidFill>
-              </a:rPr>
+              <a:rPr lang="pt-BR" sz="2800" dirty="0"/>
               <a:t>A </a:t>
             </a:r>
             <a:r>
-              <a:rPr lang="pt-BR" sz="2800" b="1" dirty="0">
-                <a:solidFill>
-                  <a:srgbClr val="C00000"/>
-                </a:solidFill>
-              </a:rPr>
+              <a:rPr lang="pt-BR" sz="2800" b="1" dirty="0"/>
               <a:t>computação</a:t>
             </a:r>
             <a:r>
-              <a:rPr lang="pt-BR" sz="2800" dirty="0">
-                <a:solidFill>
-                  <a:srgbClr val="C00000"/>
-                </a:solidFill>
-              </a:rPr>
+              <a:rPr lang="pt-BR" sz="2800" dirty="0"/>
               <a:t> pode ser definida como a busca de uma solução para um problema a partir de entradas (</a:t>
             </a:r>
             <a:r>
-              <a:rPr lang="pt-BR" sz="2800" i="1" dirty="0">
-                <a:solidFill>
-                  <a:srgbClr val="C00000"/>
-                </a:solidFill>
-              </a:rPr>
+              <a:rPr lang="pt-BR" sz="2800" i="1" dirty="0"/>
               <a:t>inputs</a:t>
             </a:r>
             <a:r>
-              <a:rPr lang="pt-BR" sz="2800" dirty="0">
-                <a:solidFill>
-                  <a:srgbClr val="C00000"/>
-                </a:solidFill>
-              </a:rPr>
+              <a:rPr lang="pt-BR" sz="2800" dirty="0"/>
               <a:t>) e tem seus resultados (</a:t>
             </a:r>
             <a:r>
-              <a:rPr lang="pt-BR" sz="2800" i="1" dirty="0">
-                <a:solidFill>
-                  <a:srgbClr val="C00000"/>
-                </a:solidFill>
-              </a:rPr>
+              <a:rPr lang="pt-BR" sz="2800" i="1" dirty="0"/>
               <a:t>outputs</a:t>
             </a:r>
             <a:r>
-              <a:rPr lang="pt-BR" sz="2800" dirty="0">
-                <a:solidFill>
-                  <a:srgbClr val="C00000"/>
-                </a:solidFill>
-              </a:rPr>
+              <a:rPr lang="pt-BR" sz="2800" dirty="0"/>
               <a:t>) depois de trabalhada através de um algoritmo.</a:t>
             </a:r>
           </a:p>
@@ -4593,7 +4683,7 @@
 </p:sld>
 </file>
 
-<file path=ppt/slides/slide3.xml><?xml version="1.0" encoding="utf-8"?>
+<file path=ppt/slides/slide4.xml><?xml version="1.0" encoding="utf-8"?>
 <p:sld xmlns:a="http://schemas.openxmlformats.org/drawingml/2006/main" xmlns:r="http://schemas.openxmlformats.org/officeDocument/2006/relationships" xmlns:p="http://schemas.openxmlformats.org/presentationml/2006/main">
   <p:cSld>
     <p:spTree>
@@ -4804,43 +4894,23 @@
           </a:lstStyle>
           <a:p>
             <a:r>
-              <a:rPr lang="en-US" altLang="pt-BR" sz="4000" dirty="0">
-                <a:solidFill>
-                  <a:srgbClr val="C00000"/>
-                </a:solidFill>
-              </a:rPr>
+              <a:rPr lang="en-US" altLang="pt-BR" sz="4000" dirty="0"/>
               <a:t>Como </a:t>
             </a:r>
             <a:r>
-              <a:rPr lang="pt-BR" altLang="pt-BR" sz="4000" noProof="1">
-                <a:solidFill>
-                  <a:srgbClr val="C00000"/>
-                </a:solidFill>
-              </a:rPr>
+              <a:rPr lang="pt-BR" altLang="pt-BR" sz="4000" noProof="1"/>
               <a:t>fazemos</a:t>
             </a:r>
             <a:r>
-              <a:rPr lang="en-US" altLang="pt-BR" sz="4000" dirty="0">
-                <a:solidFill>
-                  <a:srgbClr val="C00000"/>
-                </a:solidFill>
-              </a:rPr>
+              <a:rPr lang="en-US" altLang="pt-BR" sz="4000" dirty="0"/>
               <a:t> </a:t>
             </a:r>
             <a:r>
-              <a:rPr lang="en-US" altLang="pt-BR" sz="4000" dirty="0" err="1">
-                <a:solidFill>
-                  <a:srgbClr val="C00000"/>
-                </a:solidFill>
-              </a:rPr>
+              <a:rPr lang="en-US" altLang="pt-BR" sz="4000" dirty="0" err="1"/>
               <a:t>isso</a:t>
             </a:r>
             <a:r>
-              <a:rPr lang="en-US" altLang="pt-BR" sz="4000" dirty="0">
-                <a:solidFill>
-                  <a:srgbClr val="C00000"/>
-                </a:solidFill>
-              </a:rPr>
+              <a:rPr lang="en-US" altLang="pt-BR" sz="4000" dirty="0"/>
               <a:t>?</a:t>
             </a:r>
           </a:p>
@@ -5075,9 +5145,6 @@
             </a:pPr>
             <a:r>
               <a:rPr lang="pt-BR" altLang="ko-KR" sz="2800" dirty="0">
-                <a:solidFill>
-                  <a:srgbClr val="C00000"/>
-                </a:solidFill>
                 <a:latin typeface="Verdana" panose="020B0604030504040204" pitchFamily="34" charset="0"/>
                 <a:ea typeface="굴림" panose="020B0503020000020004" pitchFamily="34" charset="-127"/>
               </a:rPr>
@@ -5085,9 +5152,6 @@
             </a:r>
             <a:r>
               <a:rPr lang="en-US" altLang="ko-KR" sz="2800" dirty="0">
-                <a:solidFill>
-                  <a:srgbClr val="C00000"/>
-                </a:solidFill>
                 <a:latin typeface="Verdana" panose="020B0604030504040204" pitchFamily="34" charset="0"/>
                 <a:ea typeface="굴림" panose="020B0503020000020004" pitchFamily="34" charset="-127"/>
               </a:rPr>
@@ -5095,9 +5159,6 @@
             </a:r>
             <a:r>
               <a:rPr lang="pt-BR" altLang="ko-KR" sz="2800" dirty="0">
-                <a:solidFill>
-                  <a:srgbClr val="C00000"/>
-                </a:solidFill>
                 <a:latin typeface="Verdana" panose="020B0604030504040204" pitchFamily="34" charset="0"/>
                 <a:ea typeface="굴림" panose="020B0503020000020004" pitchFamily="34" charset="-127"/>
               </a:rPr>
@@ -5105,9 +5166,6 @@
             </a:r>
             <a:r>
               <a:rPr lang="en-US" altLang="ko-KR" sz="2800" dirty="0">
-                <a:solidFill>
-                  <a:srgbClr val="C00000"/>
-                </a:solidFill>
                 <a:latin typeface="Verdana" panose="020B0604030504040204" pitchFamily="34" charset="0"/>
                 <a:ea typeface="굴림" panose="020B0503020000020004" pitchFamily="34" charset="-127"/>
               </a:rPr>
@@ -5115,9 +5173,6 @@
             </a:r>
             <a:r>
               <a:rPr lang="en-US" altLang="ko-KR" sz="2800" dirty="0" err="1">
-                <a:solidFill>
-                  <a:srgbClr val="C00000"/>
-                </a:solidFill>
                 <a:latin typeface="Verdana" panose="020B0604030504040204" pitchFamily="34" charset="0"/>
                 <a:ea typeface="굴림" panose="020B0503020000020004" pitchFamily="34" charset="-127"/>
               </a:rPr>
@@ -5125,9 +5180,6 @@
             </a:r>
             <a:r>
               <a:rPr lang="en-US" altLang="ko-KR" sz="2800" dirty="0">
-                <a:solidFill>
-                  <a:srgbClr val="C00000"/>
-                </a:solidFill>
                 <a:latin typeface="Verdana" panose="020B0604030504040204" pitchFamily="34" charset="0"/>
                 <a:ea typeface="굴림" panose="020B0503020000020004" pitchFamily="34" charset="-127"/>
               </a:rPr>
@@ -5135,9 +5187,6 @@
             </a:r>
             <a:r>
               <a:rPr lang="en-US" altLang="ko-KR" sz="2800" dirty="0" err="1">
-                <a:solidFill>
-                  <a:srgbClr val="C00000"/>
-                </a:solidFill>
                 <a:latin typeface="Verdana" panose="020B0604030504040204" pitchFamily="34" charset="0"/>
                 <a:ea typeface="굴림" panose="020B0503020000020004" pitchFamily="34" charset="-127"/>
               </a:rPr>
@@ -5145,9 +5194,6 @@
             </a:r>
             <a:r>
               <a:rPr lang="en-US" altLang="ko-KR" sz="2800" dirty="0">
-                <a:solidFill>
-                  <a:srgbClr val="C00000"/>
-                </a:solidFill>
                 <a:latin typeface="Verdana" panose="020B0604030504040204" pitchFamily="34" charset="0"/>
                 <a:ea typeface="굴림" panose="020B0503020000020004" pitchFamily="34" charset="-127"/>
               </a:rPr>
@@ -5155,9 +5201,6 @@
             </a:r>
             <a:r>
               <a:rPr lang="en-US" altLang="ko-KR" sz="2800" dirty="0" err="1">
-                <a:solidFill>
-                  <a:srgbClr val="C00000"/>
-                </a:solidFill>
                 <a:latin typeface="Verdana" panose="020B0604030504040204" pitchFamily="34" charset="0"/>
                 <a:ea typeface="굴림" panose="020B0503020000020004" pitchFamily="34" charset="-127"/>
               </a:rPr>
@@ -5165,9 +5208,6 @@
             </a:r>
             <a:r>
               <a:rPr lang="en-US" altLang="ko-KR" sz="2800" dirty="0">
-                <a:solidFill>
-                  <a:srgbClr val="C00000"/>
-                </a:solidFill>
                 <a:latin typeface="Verdana" panose="020B0604030504040204" pitchFamily="34" charset="0"/>
                 <a:ea typeface="굴림" panose="020B0503020000020004" pitchFamily="34" charset="-127"/>
               </a:rPr>
@@ -5175,9 +5215,6 @@
             </a:r>
             <a:r>
               <a:rPr lang="en-US" altLang="ko-KR" sz="2800" dirty="0" err="1">
-                <a:solidFill>
-                  <a:srgbClr val="C00000"/>
-                </a:solidFill>
                 <a:latin typeface="Verdana" panose="020B0604030504040204" pitchFamily="34" charset="0"/>
                 <a:ea typeface="굴림" panose="020B0503020000020004" pitchFamily="34" charset="-127"/>
               </a:rPr>
@@ -5185,9 +5222,6 @@
             </a:r>
             <a:r>
               <a:rPr lang="en-US" altLang="ko-KR" sz="2800" dirty="0">
-                <a:solidFill>
-                  <a:srgbClr val="C00000"/>
-                </a:solidFill>
                 <a:latin typeface="Verdana" panose="020B0604030504040204" pitchFamily="34" charset="0"/>
                 <a:ea typeface="굴림" panose="020B0503020000020004" pitchFamily="34" charset="-127"/>
               </a:rPr>
@@ -5195,9 +5229,6 @@
             </a:r>
             <a:r>
               <a:rPr lang="en-US" altLang="ko-KR" sz="2800" dirty="0" err="1">
-                <a:solidFill>
-                  <a:srgbClr val="C00000"/>
-                </a:solidFill>
                 <a:latin typeface="Verdana" panose="020B0604030504040204" pitchFamily="34" charset="0"/>
                 <a:ea typeface="굴림" panose="020B0503020000020004" pitchFamily="34" charset="-127"/>
               </a:rPr>
@@ -5205,9 +5236,6 @@
             </a:r>
             <a:r>
               <a:rPr lang="en-US" altLang="ko-KR" sz="2800" dirty="0">
-                <a:solidFill>
-                  <a:srgbClr val="C00000"/>
-                </a:solidFill>
                 <a:latin typeface="Verdana" panose="020B0604030504040204" pitchFamily="34" charset="0"/>
                 <a:ea typeface="굴림" panose="020B0503020000020004" pitchFamily="34" charset="-127"/>
               </a:rPr>
@@ -5215,9 +5243,6 @@
             </a:r>
             <a:r>
               <a:rPr lang="en-US" altLang="ko-KR" sz="2800" dirty="0" err="1">
-                <a:solidFill>
-                  <a:srgbClr val="C00000"/>
-                </a:solidFill>
                 <a:latin typeface="Verdana" panose="020B0604030504040204" pitchFamily="34" charset="0"/>
                 <a:ea typeface="굴림" panose="020B0503020000020004" pitchFamily="34" charset="-127"/>
               </a:rPr>
@@ -5225,9 +5250,6 @@
             </a:r>
             <a:r>
               <a:rPr lang="en-US" altLang="ko-KR" sz="2800" dirty="0">
-                <a:solidFill>
-                  <a:srgbClr val="C00000"/>
-                </a:solidFill>
                 <a:latin typeface="Verdana" panose="020B0604030504040204" pitchFamily="34" charset="0"/>
                 <a:ea typeface="굴림" panose="020B0503020000020004" pitchFamily="34" charset="-127"/>
               </a:rPr>
@@ -5235,9 +5257,6 @@
             </a:r>
             <a:r>
               <a:rPr lang="en-US" altLang="ko-KR" sz="2800" dirty="0" err="1">
-                <a:solidFill>
-                  <a:srgbClr val="C00000"/>
-                </a:solidFill>
                 <a:latin typeface="Verdana" panose="020B0604030504040204" pitchFamily="34" charset="0"/>
                 <a:ea typeface="굴림" panose="020B0503020000020004" pitchFamily="34" charset="-127"/>
               </a:rPr>
@@ -5245,9 +5264,6 @@
             </a:r>
             <a:r>
               <a:rPr lang="en-US" altLang="ko-KR" sz="2800" dirty="0">
-                <a:solidFill>
-                  <a:srgbClr val="C00000"/>
-                </a:solidFill>
                 <a:latin typeface="Verdana" panose="020B0604030504040204" pitchFamily="34" charset="0"/>
                 <a:ea typeface="굴림" panose="020B0503020000020004" pitchFamily="34" charset="-127"/>
               </a:rPr>
@@ -5255,9 +5271,6 @@
             </a:r>
             <a:r>
               <a:rPr lang="en-US" altLang="ko-KR" sz="2800" dirty="0" err="1">
-                <a:solidFill>
-                  <a:srgbClr val="C00000"/>
-                </a:solidFill>
                 <a:latin typeface="Verdana" panose="020B0604030504040204" pitchFamily="34" charset="0"/>
                 <a:ea typeface="굴림" panose="020B0503020000020004" pitchFamily="34" charset="-127"/>
               </a:rPr>
@@ -5265,9 +5278,6 @@
             </a:r>
             <a:r>
               <a:rPr lang="en-US" altLang="ko-KR" sz="2800" dirty="0">
-                <a:solidFill>
-                  <a:srgbClr val="C00000"/>
-                </a:solidFill>
                 <a:latin typeface="Verdana" panose="020B0604030504040204" pitchFamily="34" charset="0"/>
                 <a:ea typeface="굴림" panose="020B0503020000020004" pitchFamily="34" charset="-127"/>
               </a:rPr>
@@ -5282,9 +5292,6 @@
             </a:pPr>
             <a:r>
               <a:rPr lang="en-US" altLang="ko-KR" sz="2800" dirty="0">
-                <a:solidFill>
-                  <a:srgbClr val="C00000"/>
-                </a:solidFill>
                 <a:latin typeface="Verdana" panose="020B0604030504040204" pitchFamily="34" charset="0"/>
                 <a:ea typeface="굴림" panose="020B0503020000020004" pitchFamily="34" charset="-127"/>
               </a:rPr>
@@ -5292,9 +5299,6 @@
             </a:r>
             <a:r>
               <a:rPr lang="en-US" altLang="ko-KR" sz="2800" dirty="0" err="1">
-                <a:solidFill>
-                  <a:srgbClr val="C00000"/>
-                </a:solidFill>
                 <a:latin typeface="Verdana" panose="020B0604030504040204" pitchFamily="34" charset="0"/>
                 <a:ea typeface="굴림" panose="020B0503020000020004" pitchFamily="34" charset="-127"/>
               </a:rPr>
@@ -5302,9 +5306,6 @@
             </a:r>
             <a:r>
               <a:rPr lang="en-US" altLang="ko-KR" sz="2800" dirty="0">
-                <a:solidFill>
-                  <a:srgbClr val="C00000"/>
-                </a:solidFill>
                 <a:latin typeface="Verdana" panose="020B0604030504040204" pitchFamily="34" charset="0"/>
                 <a:ea typeface="굴림" panose="020B0503020000020004" pitchFamily="34" charset="-127"/>
               </a:rPr>
@@ -5312,9 +5313,6 @@
             </a:r>
             <a:r>
               <a:rPr lang="en-US" altLang="ko-KR" sz="2800" dirty="0" err="1">
-                <a:solidFill>
-                  <a:srgbClr val="C00000"/>
-                </a:solidFill>
                 <a:latin typeface="Verdana" panose="020B0604030504040204" pitchFamily="34" charset="0"/>
                 <a:ea typeface="굴림" panose="020B0503020000020004" pitchFamily="34" charset="-127"/>
               </a:rPr>
@@ -5322,9 +5320,6 @@
             </a:r>
             <a:r>
               <a:rPr lang="en-US" altLang="ko-KR" sz="2800" dirty="0">
-                <a:solidFill>
-                  <a:srgbClr val="C00000"/>
-                </a:solidFill>
                 <a:latin typeface="Verdana" panose="020B0604030504040204" pitchFamily="34" charset="0"/>
                 <a:ea typeface="굴림" panose="020B0503020000020004" pitchFamily="34" charset="-127"/>
               </a:rPr>
@@ -5332,9 +5327,6 @@
             </a:r>
             <a:r>
               <a:rPr lang="en-US" altLang="ko-KR" sz="2800" dirty="0" err="1">
-                <a:solidFill>
-                  <a:srgbClr val="C00000"/>
-                </a:solidFill>
                 <a:latin typeface="Verdana" panose="020B0604030504040204" pitchFamily="34" charset="0"/>
                 <a:ea typeface="굴림" panose="020B0503020000020004" pitchFamily="34" charset="-127"/>
               </a:rPr>
@@ -5342,9 +5334,6 @@
             </a:r>
             <a:r>
               <a:rPr lang="en-US" altLang="ko-KR" sz="2800" dirty="0">
-                <a:solidFill>
-                  <a:srgbClr val="C00000"/>
-                </a:solidFill>
                 <a:latin typeface="Verdana" panose="020B0604030504040204" pitchFamily="34" charset="0"/>
                 <a:ea typeface="굴림" panose="020B0503020000020004" pitchFamily="34" charset="-127"/>
               </a:rPr>
@@ -5352,9 +5341,6 @@
             </a:r>
             <a:r>
               <a:rPr lang="en-US" altLang="ko-KR" sz="2800" dirty="0" err="1">
-                <a:solidFill>
-                  <a:srgbClr val="C00000"/>
-                </a:solidFill>
                 <a:latin typeface="Verdana" panose="020B0604030504040204" pitchFamily="34" charset="0"/>
                 <a:ea typeface="굴림" panose="020B0503020000020004" pitchFamily="34" charset="-127"/>
               </a:rPr>
@@ -5362,9 +5348,6 @@
             </a:r>
             <a:r>
               <a:rPr lang="en-US" altLang="ko-KR" sz="2800" dirty="0">
-                <a:solidFill>
-                  <a:srgbClr val="C00000"/>
-                </a:solidFill>
                 <a:latin typeface="Verdana" panose="020B0604030504040204" pitchFamily="34" charset="0"/>
                 <a:ea typeface="굴림" panose="020B0503020000020004" pitchFamily="34" charset="-127"/>
               </a:rPr>
@@ -5372,9 +5355,6 @@
             </a:r>
             <a:r>
               <a:rPr lang="en-US" altLang="ko-KR" sz="2800" dirty="0" err="1">
-                <a:solidFill>
-                  <a:srgbClr val="C00000"/>
-                </a:solidFill>
                 <a:latin typeface="Verdana" panose="020B0604030504040204" pitchFamily="34" charset="0"/>
                 <a:ea typeface="굴림" panose="020B0503020000020004" pitchFamily="34" charset="-127"/>
               </a:rPr>
@@ -5382,9 +5362,6 @@
             </a:r>
             <a:r>
               <a:rPr lang="en-US" altLang="ko-KR" sz="2800" dirty="0">
-                <a:solidFill>
-                  <a:srgbClr val="C00000"/>
-                </a:solidFill>
                 <a:latin typeface="Verdana" panose="020B0604030504040204" pitchFamily="34" charset="0"/>
                 <a:ea typeface="굴림" panose="020B0503020000020004" pitchFamily="34" charset="-127"/>
               </a:rPr>
@@ -5392,9 +5369,6 @@
             </a:r>
             <a:r>
               <a:rPr lang="en-US" altLang="ko-KR" sz="2800" dirty="0" err="1">
-                <a:solidFill>
-                  <a:srgbClr val="C00000"/>
-                </a:solidFill>
                 <a:latin typeface="Verdana" panose="020B0604030504040204" pitchFamily="34" charset="0"/>
                 <a:ea typeface="굴림" panose="020B0503020000020004" pitchFamily="34" charset="-127"/>
               </a:rPr>
@@ -5402,9 +5376,6 @@
             </a:r>
             <a:r>
               <a:rPr lang="en-US" altLang="ko-KR" sz="2800" dirty="0">
-                <a:solidFill>
-                  <a:srgbClr val="C00000"/>
-                </a:solidFill>
                 <a:latin typeface="Verdana" panose="020B0604030504040204" pitchFamily="34" charset="0"/>
                 <a:ea typeface="굴림" panose="020B0503020000020004" pitchFamily="34" charset="-127"/>
               </a:rPr>
@@ -5412,9 +5383,6 @@
             </a:r>
             <a:r>
               <a:rPr lang="en-US" altLang="ko-KR" sz="2800" dirty="0" err="1">
-                <a:solidFill>
-                  <a:srgbClr val="C00000"/>
-                </a:solidFill>
                 <a:latin typeface="Verdana" panose="020B0604030504040204" pitchFamily="34" charset="0"/>
                 <a:ea typeface="굴림" panose="020B0503020000020004" pitchFamily="34" charset="-127"/>
               </a:rPr>
@@ -5422,9 +5390,6 @@
             </a:r>
             <a:r>
               <a:rPr lang="en-US" altLang="ko-KR" sz="2800" dirty="0">
-                <a:solidFill>
-                  <a:srgbClr val="C00000"/>
-                </a:solidFill>
                 <a:latin typeface="Verdana" panose="020B0604030504040204" pitchFamily="34" charset="0"/>
                 <a:ea typeface="굴림" panose="020B0503020000020004" pitchFamily="34" charset="-127"/>
               </a:rPr>
@@ -5432,18 +5397,12 @@
             </a:r>
             <a:r>
               <a:rPr lang="en-US" altLang="ko-KR" sz="2800" dirty="0" err="1">
-                <a:solidFill>
-                  <a:srgbClr val="C00000"/>
-                </a:solidFill>
                 <a:latin typeface="Verdana" panose="020B0604030504040204" pitchFamily="34" charset="0"/>
                 <a:ea typeface="굴림" panose="020B0503020000020004" pitchFamily="34" charset="-127"/>
               </a:rPr>
               <a:t>computadar</a:t>
             </a:r>
             <a:endParaRPr lang="en-US" altLang="ko-KR" sz="2800" dirty="0">
-              <a:solidFill>
-                <a:srgbClr val="C00000"/>
-              </a:solidFill>
               <a:latin typeface="Verdana" panose="020B0604030504040204" pitchFamily="34" charset="0"/>
               <a:ea typeface="굴림" panose="020B0503020000020004" pitchFamily="34" charset="-127"/>
             </a:endParaRPr>
@@ -5456,9 +5415,6 @@
             </a:pPr>
             <a:r>
               <a:rPr lang="en-US" altLang="ko-KR" dirty="0">
-                <a:solidFill>
-                  <a:srgbClr val="C00000"/>
-                </a:solidFill>
                 <a:latin typeface="Verdana" panose="020B0604030504040204" pitchFamily="34" charset="0"/>
                 <a:ea typeface="굴림" panose="020B0503020000020004" pitchFamily="34" charset="-127"/>
               </a:rPr>
@@ -5466,18 +5422,12 @@
             </a:r>
             <a:r>
               <a:rPr lang="en-US" altLang="ko-KR" dirty="0" err="1">
-                <a:solidFill>
-                  <a:srgbClr val="C00000"/>
-                </a:solidFill>
                 <a:latin typeface="Verdana" panose="020B0604030504040204" pitchFamily="34" charset="0"/>
                 <a:ea typeface="굴림" panose="020B0503020000020004" pitchFamily="34" charset="-127"/>
               </a:rPr>
               <a:t>nível</a:t>
             </a:r>
             <a:endParaRPr lang="en-US" altLang="ko-KR" dirty="0">
-              <a:solidFill>
-                <a:srgbClr val="C00000"/>
-              </a:solidFill>
               <a:latin typeface="Verdana" panose="020B0604030504040204" pitchFamily="34" charset="0"/>
               <a:ea typeface="굴림" panose="020B0503020000020004" pitchFamily="34" charset="-127"/>
             </a:endParaRPr>
@@ -5490,9 +5440,6 @@
             </a:pPr>
             <a:r>
               <a:rPr lang="en-US" altLang="ko-KR" sz="2800" dirty="0">
-                <a:solidFill>
-                  <a:srgbClr val="C00000"/>
-                </a:solidFill>
                 <a:latin typeface="Verdana" panose="020B0604030504040204" pitchFamily="34" charset="0"/>
                 <a:ea typeface="굴림" panose="020B0503020000020004" pitchFamily="34" charset="-127"/>
               </a:rPr>
@@ -5507,9 +5454,6 @@
             </a:pPr>
             <a:r>
               <a:rPr lang="en-US" altLang="ko-KR" dirty="0" err="1">
-                <a:solidFill>
-                  <a:srgbClr val="C00000"/>
-                </a:solidFill>
                 <a:latin typeface="Verdana" panose="020B0604030504040204" pitchFamily="34" charset="0"/>
                 <a:ea typeface="굴림" panose="020B0503020000020004" pitchFamily="34" charset="-127"/>
               </a:rPr>
@@ -5517,9 +5461,6 @@
             </a:r>
             <a:r>
               <a:rPr lang="en-US" altLang="ko-KR" dirty="0">
-                <a:solidFill>
-                  <a:srgbClr val="C00000"/>
-                </a:solidFill>
                 <a:latin typeface="Verdana" panose="020B0604030504040204" pitchFamily="34" charset="0"/>
                 <a:ea typeface="굴림" panose="020B0503020000020004" pitchFamily="34" charset="-127"/>
               </a:rPr>
@@ -5527,18 +5468,12 @@
             </a:r>
             <a:r>
               <a:rPr lang="en-US" altLang="ko-KR" dirty="0" err="1">
-                <a:solidFill>
-                  <a:srgbClr val="C00000"/>
-                </a:solidFill>
                 <a:latin typeface="Verdana" panose="020B0604030504040204" pitchFamily="34" charset="0"/>
                 <a:ea typeface="굴림" panose="020B0503020000020004" pitchFamily="34" charset="-127"/>
               </a:rPr>
               <a:t>nível</a:t>
             </a:r>
             <a:endParaRPr lang="en-US" altLang="ko-KR" dirty="0">
-              <a:solidFill>
-                <a:srgbClr val="C00000"/>
-              </a:solidFill>
               <a:latin typeface="Verdana" panose="020B0604030504040204" pitchFamily="34" charset="0"/>
               <a:ea typeface="굴림" panose="020B0503020000020004" pitchFamily="34" charset="-127"/>
             </a:endParaRPr>
@@ -5551,9 +5486,6 @@
             </a:pPr>
             <a:r>
               <a:rPr lang="en-US" altLang="ko-KR" sz="2800" dirty="0" err="1">
-                <a:solidFill>
-                  <a:srgbClr val="C00000"/>
-                </a:solidFill>
                 <a:latin typeface="Verdana" panose="020B0604030504040204" pitchFamily="34" charset="0"/>
                 <a:ea typeface="굴림" panose="020B0503020000020004" pitchFamily="34" charset="-127"/>
               </a:rPr>
@@ -5561,19 +5493,12 @@
             </a:r>
             <a:r>
               <a:rPr lang="en-US" altLang="ko-KR" sz="2800" dirty="0">
-                <a:solidFill>
-                  <a:srgbClr val="C00000"/>
-                </a:solidFill>
                 <a:latin typeface="Verdana" panose="020B0604030504040204" pitchFamily="34" charset="0"/>
                 <a:ea typeface="굴림" panose="020B0503020000020004" pitchFamily="34" charset="-127"/>
               </a:rPr>
               <a:t>,…</a:t>
             </a:r>
-            <a:endParaRPr lang="en-US" altLang="pt-BR" dirty="0">
-              <a:solidFill>
-                <a:srgbClr val="C00000"/>
-              </a:solidFill>
-            </a:endParaRPr>
+            <a:endParaRPr lang="en-US" altLang="pt-BR" dirty="0"/>
           </a:p>
           <a:p>
             <a:pPr>
@@ -5581,11 +5506,7 @@
                 <a:spcPct val="80000"/>
               </a:lnSpc>
             </a:pPr>
-            <a:endParaRPr lang="en-US" altLang="pt-BR" sz="1800" dirty="0">
-              <a:solidFill>
-                <a:srgbClr val="C00000"/>
-              </a:solidFill>
-            </a:endParaRPr>
+            <a:endParaRPr lang="en-US" altLang="pt-BR" sz="1800" dirty="0"/>
           </a:p>
         </p:txBody>
       </p:sp>
@@ -5602,7 +5523,7 @@
 </p:sld>
 </file>
 
-<file path=ppt/slides/slide4.xml><?xml version="1.0" encoding="utf-8"?>
+<file path=ppt/slides/slide5.xml><?xml version="1.0" encoding="utf-8"?>
 <p:sld xmlns:a="http://schemas.openxmlformats.org/drawingml/2006/main" xmlns:r="http://schemas.openxmlformats.org/officeDocument/2006/relationships" xmlns:p="http://schemas.openxmlformats.org/presentationml/2006/main">
   <p:cSld>
     <p:spTree>
@@ -6155,7 +6076,7 @@
 </p:sld>
 </file>
 
-<file path=ppt/slides/slide5.xml><?xml version="1.0" encoding="utf-8"?>
+<file path=ppt/slides/slide6.xml><?xml version="1.0" encoding="utf-8"?>
 <p:sld xmlns:a="http://schemas.openxmlformats.org/drawingml/2006/main" xmlns:r="http://schemas.openxmlformats.org/officeDocument/2006/relationships" xmlns:p="http://schemas.openxmlformats.org/presentationml/2006/main">
   <p:cSld>
     <p:spTree>

</xml_diff>

<commit_message>
atualização da aula 1
</commit_message>
<xml_diff>
--- a/material/OP_aula1.pptx
+++ b/material/OP_aula1.pptx
@@ -5,14 +5,15 @@
     <p:sldMasterId id="2147483648" r:id="rId1"/>
   </p:sldMasterIdLst>
   <p:notesMasterIdLst>
-    <p:notesMasterId r:id="rId7"/>
+    <p:notesMasterId r:id="rId8"/>
   </p:notesMasterIdLst>
   <p:sldIdLst>
     <p:sldId id="256" r:id="rId2"/>
-    <p:sldId id="280" r:id="rId3"/>
-    <p:sldId id="281" r:id="rId4"/>
-    <p:sldId id="282" r:id="rId5"/>
-    <p:sldId id="283" r:id="rId6"/>
+    <p:sldId id="284" r:id="rId3"/>
+    <p:sldId id="280" r:id="rId4"/>
+    <p:sldId id="281" r:id="rId5"/>
+    <p:sldId id="282" r:id="rId6"/>
+    <p:sldId id="283" r:id="rId7"/>
   </p:sldIdLst>
   <p:sldSz cx="9144000" cy="6858000" type="screen4x3"/>
   <p:notesSz cx="6858000" cy="9144000"/>
@@ -1289,7 +1290,7 @@
             <a:lvl1pPr>
               <a:defRPr>
                 <a:solidFill>
-                  <a:srgbClr val="C00000"/>
+                  <a:schemeClr val="bg1"/>
                 </a:solidFill>
               </a:defRPr>
             </a:lvl1pPr>
@@ -1326,35 +1327,35 @@
             <a:lvl1pPr>
               <a:defRPr>
                 <a:solidFill>
-                  <a:srgbClr val="C00000"/>
+                  <a:schemeClr val="bg1"/>
                 </a:solidFill>
               </a:defRPr>
             </a:lvl1pPr>
             <a:lvl2pPr>
               <a:defRPr>
                 <a:solidFill>
-                  <a:srgbClr val="C00000"/>
+                  <a:schemeClr val="bg1"/>
                 </a:solidFill>
               </a:defRPr>
             </a:lvl2pPr>
             <a:lvl3pPr>
               <a:defRPr>
                 <a:solidFill>
-                  <a:srgbClr val="C00000"/>
+                  <a:schemeClr val="bg1"/>
                 </a:solidFill>
               </a:defRPr>
             </a:lvl3pPr>
             <a:lvl4pPr>
               <a:defRPr>
                 <a:solidFill>
-                  <a:srgbClr val="C00000"/>
+                  <a:schemeClr val="bg1"/>
                 </a:solidFill>
               </a:defRPr>
             </a:lvl4pPr>
             <a:lvl5pPr>
               <a:defRPr>
                 <a:solidFill>
-                  <a:srgbClr val="C00000"/>
+                  <a:schemeClr val="bg1"/>
                 </a:solidFill>
               </a:defRPr>
             </a:lvl5pPr>
@@ -3323,6 +3324,131 @@
       </p:grpSpPr>
       <p:sp>
         <p:nvSpPr>
+          <p:cNvPr id="2" name="Título 1">
+            <a:extLst>
+              <a:ext uri="{FF2B5EF4-FFF2-40B4-BE49-F238E27FC236}">
+                <a16:creationId xmlns:a16="http://schemas.microsoft.com/office/drawing/2014/main" id="{FAB2FF30-3D98-4E9C-B422-14D7F6B00773}"/>
+              </a:ext>
+            </a:extLst>
+          </p:cNvPr>
+          <p:cNvSpPr>
+            <a:spLocks noGrp="1"/>
+          </p:cNvSpPr>
+          <p:nvPr>
+            <p:ph type="title"/>
+          </p:nvPr>
+        </p:nvSpPr>
+        <p:spPr/>
+        <p:txBody>
+          <a:bodyPr/>
+          <a:lstStyle/>
+          <a:p>
+            <a:r>
+              <a:rPr lang="pt-BR" dirty="0"/>
+              <a:t>COMBINADOS</a:t>
+            </a:r>
+          </a:p>
+        </p:txBody>
+      </p:sp>
+      <p:sp>
+        <p:nvSpPr>
+          <p:cNvPr id="3" name="Espaço Reservado para Conteúdo 2">
+            <a:extLst>
+              <a:ext uri="{FF2B5EF4-FFF2-40B4-BE49-F238E27FC236}">
+                <a16:creationId xmlns:a16="http://schemas.microsoft.com/office/drawing/2014/main" id="{CFED1DE8-DE66-418B-8087-4D75F0174567}"/>
+              </a:ext>
+            </a:extLst>
+          </p:cNvPr>
+          <p:cNvSpPr>
+            <a:spLocks noGrp="1"/>
+          </p:cNvSpPr>
+          <p:nvPr>
+            <p:ph idx="1"/>
+          </p:nvPr>
+        </p:nvSpPr>
+        <p:spPr>
+          <a:xfrm>
+            <a:off x="107504" y="1087233"/>
+            <a:ext cx="7315200" cy="4572000"/>
+          </a:xfrm>
+        </p:spPr>
+        <p:txBody>
+          <a:bodyPr/>
+          <a:lstStyle/>
+          <a:p>
+            <a:r>
+              <a:rPr lang="pt-BR" dirty="0">
+                <a:solidFill>
+                  <a:srgbClr val="FFFF00"/>
+                </a:solidFill>
+              </a:rPr>
+              <a:t>QUANDO O INSTRUTOR ESTIVER FALANDO OS ALUNOS DEVEM FICAR EM SILÊNCIO</a:t>
+            </a:r>
+          </a:p>
+          <a:p>
+            <a:r>
+              <a:rPr lang="pt-BR" dirty="0">
+                <a:solidFill>
+                  <a:srgbClr val="FFFF00"/>
+                </a:solidFill>
+              </a:rPr>
+              <a:t>CONVERSAS PARALELAS ATRAPALHAM A TURMA</a:t>
+            </a:r>
+          </a:p>
+          <a:p>
+            <a:r>
+              <a:rPr lang="pt-BR" dirty="0">
+                <a:solidFill>
+                  <a:srgbClr val="FFFF00"/>
+                </a:solidFill>
+              </a:rPr>
+              <a:t>SE PERSISTIR A CONVERSA SERÁ PEDIDO PARA O ALUNO SE RETIRAR DA SALA</a:t>
+            </a:r>
+          </a:p>
+          <a:p>
+            <a:r>
+              <a:rPr lang="pt-BR" dirty="0">
+                <a:solidFill>
+                  <a:srgbClr val="FFFF00"/>
+                </a:solidFill>
+              </a:rPr>
+              <a:t>SE ISSO SE REPETIR O ALUNO SERÁ CONVIDADO A SE DESLIGAR DA OFICINA</a:t>
+            </a:r>
+          </a:p>
+        </p:txBody>
+      </p:sp>
+    </p:spTree>
+    <p:extLst>
+      <p:ext uri="{BB962C8B-B14F-4D97-AF65-F5344CB8AC3E}">
+        <p14:creationId xmlns:p14="http://schemas.microsoft.com/office/powerpoint/2010/main" val="2821912879"/>
+      </p:ext>
+    </p:extLst>
+  </p:cSld>
+  <p:clrMapOvr>
+    <a:masterClrMapping/>
+  </p:clrMapOvr>
+</p:sld>
+</file>
+
+<file path=ppt/slides/slide3.xml><?xml version="1.0" encoding="utf-8"?>
+<p:sld xmlns:a="http://schemas.openxmlformats.org/drawingml/2006/main" xmlns:r="http://schemas.openxmlformats.org/officeDocument/2006/relationships" xmlns:p="http://schemas.openxmlformats.org/presentationml/2006/main">
+  <p:cSld>
+    <p:spTree>
+      <p:nvGrpSpPr>
+        <p:cNvPr id="1" name=""/>
+        <p:cNvGrpSpPr/>
+        <p:nvPr/>
+      </p:nvGrpSpPr>
+      <p:grpSpPr>
+        <a:xfrm>
+          <a:off x="0" y="0"/>
+          <a:ext cx="0" cy="0"/>
+          <a:chOff x="0" y="0"/>
+          <a:chExt cx="0" cy="0"/>
+        </a:xfrm>
+      </p:grpSpPr>
+      <p:sp>
+        <p:nvSpPr>
           <p:cNvPr id="4" name="Rectangle 4">
             <a:extLst>
               <a:ext uri="{FF2B5EF4-FFF2-40B4-BE49-F238E27FC236}">
@@ -3355,18 +3481,10 @@
               </a:lnSpc>
             </a:pPr>
             <a:r>
-              <a:rPr lang="en-US" altLang="pt-BR" sz="3400" dirty="0">
-                <a:solidFill>
-                  <a:srgbClr val="C00000"/>
-                </a:solidFill>
-              </a:rPr>
+              <a:rPr lang="en-US" altLang="pt-BR" sz="3400" dirty="0"/>
               <a:t>O QUE É COMPUTAÇÃO</a:t>
             </a:r>
-            <a:endParaRPr lang="ru-RU" altLang="pt-BR" sz="3400" dirty="0">
-              <a:solidFill>
-                <a:srgbClr val="C00000"/>
-              </a:solidFill>
-            </a:endParaRPr>
+            <a:endParaRPr lang="ru-RU" altLang="pt-BR" sz="3400" dirty="0"/>
           </a:p>
         </p:txBody>
       </p:sp>
@@ -3716,59 +3834,31 @@
           </a:lstStyle>
           <a:p>
             <a:r>
-              <a:rPr lang="pt-BR" sz="2800" dirty="0">
-                <a:solidFill>
-                  <a:srgbClr val="C00000"/>
-                </a:solidFill>
-              </a:rPr>
+              <a:rPr lang="pt-BR" sz="2800" dirty="0"/>
               <a:t>A </a:t>
             </a:r>
             <a:r>
-              <a:rPr lang="pt-BR" sz="2800" b="1" dirty="0">
-                <a:solidFill>
-                  <a:srgbClr val="C00000"/>
-                </a:solidFill>
-              </a:rPr>
+              <a:rPr lang="pt-BR" sz="2800" b="1" dirty="0"/>
               <a:t>computação</a:t>
             </a:r>
             <a:r>
-              <a:rPr lang="pt-BR" sz="2800" dirty="0">
-                <a:solidFill>
-                  <a:srgbClr val="C00000"/>
-                </a:solidFill>
-              </a:rPr>
+              <a:rPr lang="pt-BR" sz="2800" dirty="0"/>
               <a:t> pode ser definida como a busca de uma solução para um problema a partir de entradas (</a:t>
             </a:r>
             <a:r>
-              <a:rPr lang="pt-BR" sz="2800" i="1" dirty="0">
-                <a:solidFill>
-                  <a:srgbClr val="C00000"/>
-                </a:solidFill>
-              </a:rPr>
+              <a:rPr lang="pt-BR" sz="2800" i="1" dirty="0"/>
               <a:t>inputs</a:t>
             </a:r>
             <a:r>
-              <a:rPr lang="pt-BR" sz="2800" dirty="0">
-                <a:solidFill>
-                  <a:srgbClr val="C00000"/>
-                </a:solidFill>
-              </a:rPr>
+              <a:rPr lang="pt-BR" sz="2800" dirty="0"/>
               <a:t>) e tem seus resultados (</a:t>
             </a:r>
             <a:r>
-              <a:rPr lang="pt-BR" sz="2800" i="1" dirty="0">
-                <a:solidFill>
-                  <a:srgbClr val="C00000"/>
-                </a:solidFill>
-              </a:rPr>
+              <a:rPr lang="pt-BR" sz="2800" i="1" dirty="0"/>
               <a:t>outputs</a:t>
             </a:r>
             <a:r>
-              <a:rPr lang="pt-BR" sz="2800" dirty="0">
-                <a:solidFill>
-                  <a:srgbClr val="C00000"/>
-                </a:solidFill>
-              </a:rPr>
+              <a:rPr lang="pt-BR" sz="2800" dirty="0"/>
               <a:t>) depois de trabalhada através de um algoritmo.</a:t>
             </a:r>
           </a:p>
@@ -4593,7 +4683,7 @@
 </p:sld>
 </file>
 
-<file path=ppt/slides/slide3.xml><?xml version="1.0" encoding="utf-8"?>
+<file path=ppt/slides/slide4.xml><?xml version="1.0" encoding="utf-8"?>
 <p:sld xmlns:a="http://schemas.openxmlformats.org/drawingml/2006/main" xmlns:r="http://schemas.openxmlformats.org/officeDocument/2006/relationships" xmlns:p="http://schemas.openxmlformats.org/presentationml/2006/main">
   <p:cSld>
     <p:spTree>
@@ -4804,43 +4894,23 @@
           </a:lstStyle>
           <a:p>
             <a:r>
-              <a:rPr lang="en-US" altLang="pt-BR" sz="4000" dirty="0">
-                <a:solidFill>
-                  <a:srgbClr val="C00000"/>
-                </a:solidFill>
-              </a:rPr>
+              <a:rPr lang="en-US" altLang="pt-BR" sz="4000" dirty="0"/>
               <a:t>Como </a:t>
             </a:r>
             <a:r>
-              <a:rPr lang="pt-BR" altLang="pt-BR" sz="4000" noProof="1">
-                <a:solidFill>
-                  <a:srgbClr val="C00000"/>
-                </a:solidFill>
-              </a:rPr>
+              <a:rPr lang="pt-BR" altLang="pt-BR" sz="4000" noProof="1"/>
               <a:t>fazemos</a:t>
             </a:r>
             <a:r>
-              <a:rPr lang="en-US" altLang="pt-BR" sz="4000" dirty="0">
-                <a:solidFill>
-                  <a:srgbClr val="C00000"/>
-                </a:solidFill>
-              </a:rPr>
+              <a:rPr lang="en-US" altLang="pt-BR" sz="4000" dirty="0"/>
               <a:t> </a:t>
             </a:r>
             <a:r>
-              <a:rPr lang="en-US" altLang="pt-BR" sz="4000" dirty="0" err="1">
-                <a:solidFill>
-                  <a:srgbClr val="C00000"/>
-                </a:solidFill>
-              </a:rPr>
+              <a:rPr lang="en-US" altLang="pt-BR" sz="4000" dirty="0" err="1"/>
               <a:t>isso</a:t>
             </a:r>
             <a:r>
-              <a:rPr lang="en-US" altLang="pt-BR" sz="4000" dirty="0">
-                <a:solidFill>
-                  <a:srgbClr val="C00000"/>
-                </a:solidFill>
-              </a:rPr>
+              <a:rPr lang="en-US" altLang="pt-BR" sz="4000" dirty="0"/>
               <a:t>?</a:t>
             </a:r>
           </a:p>
@@ -5075,9 +5145,6 @@
             </a:pPr>
             <a:r>
               <a:rPr lang="pt-BR" altLang="ko-KR" sz="2800" dirty="0">
-                <a:solidFill>
-                  <a:srgbClr val="C00000"/>
-                </a:solidFill>
                 <a:latin typeface="Verdana" panose="020B0604030504040204" pitchFamily="34" charset="0"/>
                 <a:ea typeface="굴림" panose="020B0503020000020004" pitchFamily="34" charset="-127"/>
               </a:rPr>
@@ -5085,9 +5152,6 @@
             </a:r>
             <a:r>
               <a:rPr lang="en-US" altLang="ko-KR" sz="2800" dirty="0">
-                <a:solidFill>
-                  <a:srgbClr val="C00000"/>
-                </a:solidFill>
                 <a:latin typeface="Verdana" panose="020B0604030504040204" pitchFamily="34" charset="0"/>
                 <a:ea typeface="굴림" panose="020B0503020000020004" pitchFamily="34" charset="-127"/>
               </a:rPr>
@@ -5095,9 +5159,6 @@
             </a:r>
             <a:r>
               <a:rPr lang="pt-BR" altLang="ko-KR" sz="2800" dirty="0">
-                <a:solidFill>
-                  <a:srgbClr val="C00000"/>
-                </a:solidFill>
                 <a:latin typeface="Verdana" panose="020B0604030504040204" pitchFamily="34" charset="0"/>
                 <a:ea typeface="굴림" panose="020B0503020000020004" pitchFamily="34" charset="-127"/>
               </a:rPr>
@@ -5105,9 +5166,6 @@
             </a:r>
             <a:r>
               <a:rPr lang="en-US" altLang="ko-KR" sz="2800" dirty="0">
-                <a:solidFill>
-                  <a:srgbClr val="C00000"/>
-                </a:solidFill>
                 <a:latin typeface="Verdana" panose="020B0604030504040204" pitchFamily="34" charset="0"/>
                 <a:ea typeface="굴림" panose="020B0503020000020004" pitchFamily="34" charset="-127"/>
               </a:rPr>
@@ -5115,9 +5173,6 @@
             </a:r>
             <a:r>
               <a:rPr lang="en-US" altLang="ko-KR" sz="2800" dirty="0" err="1">
-                <a:solidFill>
-                  <a:srgbClr val="C00000"/>
-                </a:solidFill>
                 <a:latin typeface="Verdana" panose="020B0604030504040204" pitchFamily="34" charset="0"/>
                 <a:ea typeface="굴림" panose="020B0503020000020004" pitchFamily="34" charset="-127"/>
               </a:rPr>
@@ -5125,9 +5180,6 @@
             </a:r>
             <a:r>
               <a:rPr lang="en-US" altLang="ko-KR" sz="2800" dirty="0">
-                <a:solidFill>
-                  <a:srgbClr val="C00000"/>
-                </a:solidFill>
                 <a:latin typeface="Verdana" panose="020B0604030504040204" pitchFamily="34" charset="0"/>
                 <a:ea typeface="굴림" panose="020B0503020000020004" pitchFamily="34" charset="-127"/>
               </a:rPr>
@@ -5135,9 +5187,6 @@
             </a:r>
             <a:r>
               <a:rPr lang="en-US" altLang="ko-KR" sz="2800" dirty="0" err="1">
-                <a:solidFill>
-                  <a:srgbClr val="C00000"/>
-                </a:solidFill>
                 <a:latin typeface="Verdana" panose="020B0604030504040204" pitchFamily="34" charset="0"/>
                 <a:ea typeface="굴림" panose="020B0503020000020004" pitchFamily="34" charset="-127"/>
               </a:rPr>
@@ -5145,9 +5194,6 @@
             </a:r>
             <a:r>
               <a:rPr lang="en-US" altLang="ko-KR" sz="2800" dirty="0">
-                <a:solidFill>
-                  <a:srgbClr val="C00000"/>
-                </a:solidFill>
                 <a:latin typeface="Verdana" panose="020B0604030504040204" pitchFamily="34" charset="0"/>
                 <a:ea typeface="굴림" panose="020B0503020000020004" pitchFamily="34" charset="-127"/>
               </a:rPr>
@@ -5155,9 +5201,6 @@
             </a:r>
             <a:r>
               <a:rPr lang="en-US" altLang="ko-KR" sz="2800" dirty="0" err="1">
-                <a:solidFill>
-                  <a:srgbClr val="C00000"/>
-                </a:solidFill>
                 <a:latin typeface="Verdana" panose="020B0604030504040204" pitchFamily="34" charset="0"/>
                 <a:ea typeface="굴림" panose="020B0503020000020004" pitchFamily="34" charset="-127"/>
               </a:rPr>
@@ -5165,9 +5208,6 @@
             </a:r>
             <a:r>
               <a:rPr lang="en-US" altLang="ko-KR" sz="2800" dirty="0">
-                <a:solidFill>
-                  <a:srgbClr val="C00000"/>
-                </a:solidFill>
                 <a:latin typeface="Verdana" panose="020B0604030504040204" pitchFamily="34" charset="0"/>
                 <a:ea typeface="굴림" panose="020B0503020000020004" pitchFamily="34" charset="-127"/>
               </a:rPr>
@@ -5175,9 +5215,6 @@
             </a:r>
             <a:r>
               <a:rPr lang="en-US" altLang="ko-KR" sz="2800" dirty="0" err="1">
-                <a:solidFill>
-                  <a:srgbClr val="C00000"/>
-                </a:solidFill>
                 <a:latin typeface="Verdana" panose="020B0604030504040204" pitchFamily="34" charset="0"/>
                 <a:ea typeface="굴림" panose="020B0503020000020004" pitchFamily="34" charset="-127"/>
               </a:rPr>
@@ -5185,9 +5222,6 @@
             </a:r>
             <a:r>
               <a:rPr lang="en-US" altLang="ko-KR" sz="2800" dirty="0">
-                <a:solidFill>
-                  <a:srgbClr val="C00000"/>
-                </a:solidFill>
                 <a:latin typeface="Verdana" panose="020B0604030504040204" pitchFamily="34" charset="0"/>
                 <a:ea typeface="굴림" panose="020B0503020000020004" pitchFamily="34" charset="-127"/>
               </a:rPr>
@@ -5195,9 +5229,6 @@
             </a:r>
             <a:r>
               <a:rPr lang="en-US" altLang="ko-KR" sz="2800" dirty="0" err="1">
-                <a:solidFill>
-                  <a:srgbClr val="C00000"/>
-                </a:solidFill>
                 <a:latin typeface="Verdana" panose="020B0604030504040204" pitchFamily="34" charset="0"/>
                 <a:ea typeface="굴림" panose="020B0503020000020004" pitchFamily="34" charset="-127"/>
               </a:rPr>
@@ -5205,9 +5236,6 @@
             </a:r>
             <a:r>
               <a:rPr lang="en-US" altLang="ko-KR" sz="2800" dirty="0">
-                <a:solidFill>
-                  <a:srgbClr val="C00000"/>
-                </a:solidFill>
                 <a:latin typeface="Verdana" panose="020B0604030504040204" pitchFamily="34" charset="0"/>
                 <a:ea typeface="굴림" panose="020B0503020000020004" pitchFamily="34" charset="-127"/>
               </a:rPr>
@@ -5215,9 +5243,6 @@
             </a:r>
             <a:r>
               <a:rPr lang="en-US" altLang="ko-KR" sz="2800" dirty="0" err="1">
-                <a:solidFill>
-                  <a:srgbClr val="C00000"/>
-                </a:solidFill>
                 <a:latin typeface="Verdana" panose="020B0604030504040204" pitchFamily="34" charset="0"/>
                 <a:ea typeface="굴림" panose="020B0503020000020004" pitchFamily="34" charset="-127"/>
               </a:rPr>
@@ -5225,9 +5250,6 @@
             </a:r>
             <a:r>
               <a:rPr lang="en-US" altLang="ko-KR" sz="2800" dirty="0">
-                <a:solidFill>
-                  <a:srgbClr val="C00000"/>
-                </a:solidFill>
                 <a:latin typeface="Verdana" panose="020B0604030504040204" pitchFamily="34" charset="0"/>
                 <a:ea typeface="굴림" panose="020B0503020000020004" pitchFamily="34" charset="-127"/>
               </a:rPr>
@@ -5235,9 +5257,6 @@
             </a:r>
             <a:r>
               <a:rPr lang="en-US" altLang="ko-KR" sz="2800" dirty="0" err="1">
-                <a:solidFill>
-                  <a:srgbClr val="C00000"/>
-                </a:solidFill>
                 <a:latin typeface="Verdana" panose="020B0604030504040204" pitchFamily="34" charset="0"/>
                 <a:ea typeface="굴림" panose="020B0503020000020004" pitchFamily="34" charset="-127"/>
               </a:rPr>
@@ -5245,9 +5264,6 @@
             </a:r>
             <a:r>
               <a:rPr lang="en-US" altLang="ko-KR" sz="2800" dirty="0">
-                <a:solidFill>
-                  <a:srgbClr val="C00000"/>
-                </a:solidFill>
                 <a:latin typeface="Verdana" panose="020B0604030504040204" pitchFamily="34" charset="0"/>
                 <a:ea typeface="굴림" panose="020B0503020000020004" pitchFamily="34" charset="-127"/>
               </a:rPr>
@@ -5255,9 +5271,6 @@
             </a:r>
             <a:r>
               <a:rPr lang="en-US" altLang="ko-KR" sz="2800" dirty="0" err="1">
-                <a:solidFill>
-                  <a:srgbClr val="C00000"/>
-                </a:solidFill>
                 <a:latin typeface="Verdana" panose="020B0604030504040204" pitchFamily="34" charset="0"/>
                 <a:ea typeface="굴림" panose="020B0503020000020004" pitchFamily="34" charset="-127"/>
               </a:rPr>
@@ -5265,9 +5278,6 @@
             </a:r>
             <a:r>
               <a:rPr lang="en-US" altLang="ko-KR" sz="2800" dirty="0">
-                <a:solidFill>
-                  <a:srgbClr val="C00000"/>
-                </a:solidFill>
                 <a:latin typeface="Verdana" panose="020B0604030504040204" pitchFamily="34" charset="0"/>
                 <a:ea typeface="굴림" panose="020B0503020000020004" pitchFamily="34" charset="-127"/>
               </a:rPr>
@@ -5282,9 +5292,6 @@
             </a:pPr>
             <a:r>
               <a:rPr lang="en-US" altLang="ko-KR" sz="2800" dirty="0">
-                <a:solidFill>
-                  <a:srgbClr val="C00000"/>
-                </a:solidFill>
                 <a:latin typeface="Verdana" panose="020B0604030504040204" pitchFamily="34" charset="0"/>
                 <a:ea typeface="굴림" panose="020B0503020000020004" pitchFamily="34" charset="-127"/>
               </a:rPr>
@@ -5292,9 +5299,6 @@
             </a:r>
             <a:r>
               <a:rPr lang="en-US" altLang="ko-KR" sz="2800" dirty="0" err="1">
-                <a:solidFill>
-                  <a:srgbClr val="C00000"/>
-                </a:solidFill>
                 <a:latin typeface="Verdana" panose="020B0604030504040204" pitchFamily="34" charset="0"/>
                 <a:ea typeface="굴림" panose="020B0503020000020004" pitchFamily="34" charset="-127"/>
               </a:rPr>
@@ -5302,9 +5306,6 @@
             </a:r>
             <a:r>
               <a:rPr lang="en-US" altLang="ko-KR" sz="2800" dirty="0">
-                <a:solidFill>
-                  <a:srgbClr val="C00000"/>
-                </a:solidFill>
                 <a:latin typeface="Verdana" panose="020B0604030504040204" pitchFamily="34" charset="0"/>
                 <a:ea typeface="굴림" panose="020B0503020000020004" pitchFamily="34" charset="-127"/>
               </a:rPr>
@@ -5312,9 +5313,6 @@
             </a:r>
             <a:r>
               <a:rPr lang="en-US" altLang="ko-KR" sz="2800" dirty="0" err="1">
-                <a:solidFill>
-                  <a:srgbClr val="C00000"/>
-                </a:solidFill>
                 <a:latin typeface="Verdana" panose="020B0604030504040204" pitchFamily="34" charset="0"/>
                 <a:ea typeface="굴림" panose="020B0503020000020004" pitchFamily="34" charset="-127"/>
               </a:rPr>
@@ -5322,9 +5320,6 @@
             </a:r>
             <a:r>
               <a:rPr lang="en-US" altLang="ko-KR" sz="2800" dirty="0">
-                <a:solidFill>
-                  <a:srgbClr val="C00000"/>
-                </a:solidFill>
                 <a:latin typeface="Verdana" panose="020B0604030504040204" pitchFamily="34" charset="0"/>
                 <a:ea typeface="굴림" panose="020B0503020000020004" pitchFamily="34" charset="-127"/>
               </a:rPr>
@@ -5332,9 +5327,6 @@
             </a:r>
             <a:r>
               <a:rPr lang="en-US" altLang="ko-KR" sz="2800" dirty="0" err="1">
-                <a:solidFill>
-                  <a:srgbClr val="C00000"/>
-                </a:solidFill>
                 <a:latin typeface="Verdana" panose="020B0604030504040204" pitchFamily="34" charset="0"/>
                 <a:ea typeface="굴림" panose="020B0503020000020004" pitchFamily="34" charset="-127"/>
               </a:rPr>
@@ -5342,9 +5334,6 @@
             </a:r>
             <a:r>
               <a:rPr lang="en-US" altLang="ko-KR" sz="2800" dirty="0">
-                <a:solidFill>
-                  <a:srgbClr val="C00000"/>
-                </a:solidFill>
                 <a:latin typeface="Verdana" panose="020B0604030504040204" pitchFamily="34" charset="0"/>
                 <a:ea typeface="굴림" panose="020B0503020000020004" pitchFamily="34" charset="-127"/>
               </a:rPr>
@@ -5352,9 +5341,6 @@
             </a:r>
             <a:r>
               <a:rPr lang="en-US" altLang="ko-KR" sz="2800" dirty="0" err="1">
-                <a:solidFill>
-                  <a:srgbClr val="C00000"/>
-                </a:solidFill>
                 <a:latin typeface="Verdana" panose="020B0604030504040204" pitchFamily="34" charset="0"/>
                 <a:ea typeface="굴림" panose="020B0503020000020004" pitchFamily="34" charset="-127"/>
               </a:rPr>
@@ -5362,9 +5348,6 @@
             </a:r>
             <a:r>
               <a:rPr lang="en-US" altLang="ko-KR" sz="2800" dirty="0">
-                <a:solidFill>
-                  <a:srgbClr val="C00000"/>
-                </a:solidFill>
                 <a:latin typeface="Verdana" panose="020B0604030504040204" pitchFamily="34" charset="0"/>
                 <a:ea typeface="굴림" panose="020B0503020000020004" pitchFamily="34" charset="-127"/>
               </a:rPr>
@@ -5372,9 +5355,6 @@
             </a:r>
             <a:r>
               <a:rPr lang="en-US" altLang="ko-KR" sz="2800" dirty="0" err="1">
-                <a:solidFill>
-                  <a:srgbClr val="C00000"/>
-                </a:solidFill>
                 <a:latin typeface="Verdana" panose="020B0604030504040204" pitchFamily="34" charset="0"/>
                 <a:ea typeface="굴림" panose="020B0503020000020004" pitchFamily="34" charset="-127"/>
               </a:rPr>
@@ -5382,9 +5362,6 @@
             </a:r>
             <a:r>
               <a:rPr lang="en-US" altLang="ko-KR" sz="2800" dirty="0">
-                <a:solidFill>
-                  <a:srgbClr val="C00000"/>
-                </a:solidFill>
                 <a:latin typeface="Verdana" panose="020B0604030504040204" pitchFamily="34" charset="0"/>
                 <a:ea typeface="굴림" panose="020B0503020000020004" pitchFamily="34" charset="-127"/>
               </a:rPr>
@@ -5392,9 +5369,6 @@
             </a:r>
             <a:r>
               <a:rPr lang="en-US" altLang="ko-KR" sz="2800" dirty="0" err="1">
-                <a:solidFill>
-                  <a:srgbClr val="C00000"/>
-                </a:solidFill>
                 <a:latin typeface="Verdana" panose="020B0604030504040204" pitchFamily="34" charset="0"/>
                 <a:ea typeface="굴림" panose="020B0503020000020004" pitchFamily="34" charset="-127"/>
               </a:rPr>
@@ -5402,9 +5376,6 @@
             </a:r>
             <a:r>
               <a:rPr lang="en-US" altLang="ko-KR" sz="2800" dirty="0">
-                <a:solidFill>
-                  <a:srgbClr val="C00000"/>
-                </a:solidFill>
                 <a:latin typeface="Verdana" panose="020B0604030504040204" pitchFamily="34" charset="0"/>
                 <a:ea typeface="굴림" panose="020B0503020000020004" pitchFamily="34" charset="-127"/>
               </a:rPr>
@@ -5412,9 +5383,6 @@
             </a:r>
             <a:r>
               <a:rPr lang="en-US" altLang="ko-KR" sz="2800" dirty="0" err="1">
-                <a:solidFill>
-                  <a:srgbClr val="C00000"/>
-                </a:solidFill>
                 <a:latin typeface="Verdana" panose="020B0604030504040204" pitchFamily="34" charset="0"/>
                 <a:ea typeface="굴림" panose="020B0503020000020004" pitchFamily="34" charset="-127"/>
               </a:rPr>
@@ -5422,9 +5390,6 @@
             </a:r>
             <a:r>
               <a:rPr lang="en-US" altLang="ko-KR" sz="2800" dirty="0">
-                <a:solidFill>
-                  <a:srgbClr val="C00000"/>
-                </a:solidFill>
                 <a:latin typeface="Verdana" panose="020B0604030504040204" pitchFamily="34" charset="0"/>
                 <a:ea typeface="굴림" panose="020B0503020000020004" pitchFamily="34" charset="-127"/>
               </a:rPr>
@@ -5432,18 +5397,12 @@
             </a:r>
             <a:r>
               <a:rPr lang="en-US" altLang="ko-KR" sz="2800" dirty="0" err="1">
-                <a:solidFill>
-                  <a:srgbClr val="C00000"/>
-                </a:solidFill>
                 <a:latin typeface="Verdana" panose="020B0604030504040204" pitchFamily="34" charset="0"/>
                 <a:ea typeface="굴림" panose="020B0503020000020004" pitchFamily="34" charset="-127"/>
               </a:rPr>
               <a:t>computadar</a:t>
             </a:r>
             <a:endParaRPr lang="en-US" altLang="ko-KR" sz="2800" dirty="0">
-              <a:solidFill>
-                <a:srgbClr val="C00000"/>
-              </a:solidFill>
               <a:latin typeface="Verdana" panose="020B0604030504040204" pitchFamily="34" charset="0"/>
               <a:ea typeface="굴림" panose="020B0503020000020004" pitchFamily="34" charset="-127"/>
             </a:endParaRPr>
@@ -5456,9 +5415,6 @@
             </a:pPr>
             <a:r>
               <a:rPr lang="en-US" altLang="ko-KR" dirty="0">
-                <a:solidFill>
-                  <a:srgbClr val="C00000"/>
-                </a:solidFill>
                 <a:latin typeface="Verdana" panose="020B0604030504040204" pitchFamily="34" charset="0"/>
                 <a:ea typeface="굴림" panose="020B0503020000020004" pitchFamily="34" charset="-127"/>
               </a:rPr>
@@ -5466,18 +5422,12 @@
             </a:r>
             <a:r>
               <a:rPr lang="en-US" altLang="ko-KR" dirty="0" err="1">
-                <a:solidFill>
-                  <a:srgbClr val="C00000"/>
-                </a:solidFill>
                 <a:latin typeface="Verdana" panose="020B0604030504040204" pitchFamily="34" charset="0"/>
                 <a:ea typeface="굴림" panose="020B0503020000020004" pitchFamily="34" charset="-127"/>
               </a:rPr>
               <a:t>nível</a:t>
             </a:r>
             <a:endParaRPr lang="en-US" altLang="ko-KR" dirty="0">
-              <a:solidFill>
-                <a:srgbClr val="C00000"/>
-              </a:solidFill>
               <a:latin typeface="Verdana" panose="020B0604030504040204" pitchFamily="34" charset="0"/>
               <a:ea typeface="굴림" panose="020B0503020000020004" pitchFamily="34" charset="-127"/>
             </a:endParaRPr>
@@ -5490,9 +5440,6 @@
             </a:pPr>
             <a:r>
               <a:rPr lang="en-US" altLang="ko-KR" sz="2800" dirty="0">
-                <a:solidFill>
-                  <a:srgbClr val="C00000"/>
-                </a:solidFill>
                 <a:latin typeface="Verdana" panose="020B0604030504040204" pitchFamily="34" charset="0"/>
                 <a:ea typeface="굴림" panose="020B0503020000020004" pitchFamily="34" charset="-127"/>
               </a:rPr>
@@ -5507,9 +5454,6 @@
             </a:pPr>
             <a:r>
               <a:rPr lang="en-US" altLang="ko-KR" dirty="0" err="1">
-                <a:solidFill>
-                  <a:srgbClr val="C00000"/>
-                </a:solidFill>
                 <a:latin typeface="Verdana" panose="020B0604030504040204" pitchFamily="34" charset="0"/>
                 <a:ea typeface="굴림" panose="020B0503020000020004" pitchFamily="34" charset="-127"/>
               </a:rPr>
@@ -5517,9 +5461,6 @@
             </a:r>
             <a:r>
               <a:rPr lang="en-US" altLang="ko-KR" dirty="0">
-                <a:solidFill>
-                  <a:srgbClr val="C00000"/>
-                </a:solidFill>
                 <a:latin typeface="Verdana" panose="020B0604030504040204" pitchFamily="34" charset="0"/>
                 <a:ea typeface="굴림" panose="020B0503020000020004" pitchFamily="34" charset="-127"/>
               </a:rPr>
@@ -5527,18 +5468,12 @@
             </a:r>
             <a:r>
               <a:rPr lang="en-US" altLang="ko-KR" dirty="0" err="1">
-                <a:solidFill>
-                  <a:srgbClr val="C00000"/>
-                </a:solidFill>
                 <a:latin typeface="Verdana" panose="020B0604030504040204" pitchFamily="34" charset="0"/>
                 <a:ea typeface="굴림" panose="020B0503020000020004" pitchFamily="34" charset="-127"/>
               </a:rPr>
               <a:t>nível</a:t>
             </a:r>
             <a:endParaRPr lang="en-US" altLang="ko-KR" dirty="0">
-              <a:solidFill>
-                <a:srgbClr val="C00000"/>
-              </a:solidFill>
               <a:latin typeface="Verdana" panose="020B0604030504040204" pitchFamily="34" charset="0"/>
               <a:ea typeface="굴림" panose="020B0503020000020004" pitchFamily="34" charset="-127"/>
             </a:endParaRPr>
@@ -5551,9 +5486,6 @@
             </a:pPr>
             <a:r>
               <a:rPr lang="en-US" altLang="ko-KR" sz="2800" dirty="0" err="1">
-                <a:solidFill>
-                  <a:srgbClr val="C00000"/>
-                </a:solidFill>
                 <a:latin typeface="Verdana" panose="020B0604030504040204" pitchFamily="34" charset="0"/>
                 <a:ea typeface="굴림" panose="020B0503020000020004" pitchFamily="34" charset="-127"/>
               </a:rPr>
@@ -5561,19 +5493,12 @@
             </a:r>
             <a:r>
               <a:rPr lang="en-US" altLang="ko-KR" sz="2800" dirty="0">
-                <a:solidFill>
-                  <a:srgbClr val="C00000"/>
-                </a:solidFill>
                 <a:latin typeface="Verdana" panose="020B0604030504040204" pitchFamily="34" charset="0"/>
                 <a:ea typeface="굴림" panose="020B0503020000020004" pitchFamily="34" charset="-127"/>
               </a:rPr>
               <a:t>,…</a:t>
             </a:r>
-            <a:endParaRPr lang="en-US" altLang="pt-BR" dirty="0">
-              <a:solidFill>
-                <a:srgbClr val="C00000"/>
-              </a:solidFill>
-            </a:endParaRPr>
+            <a:endParaRPr lang="en-US" altLang="pt-BR" dirty="0"/>
           </a:p>
           <a:p>
             <a:pPr>
@@ -5581,11 +5506,7 @@
                 <a:spcPct val="80000"/>
               </a:lnSpc>
             </a:pPr>
-            <a:endParaRPr lang="en-US" altLang="pt-BR" sz="1800" dirty="0">
-              <a:solidFill>
-                <a:srgbClr val="C00000"/>
-              </a:solidFill>
-            </a:endParaRPr>
+            <a:endParaRPr lang="en-US" altLang="pt-BR" sz="1800" dirty="0"/>
           </a:p>
         </p:txBody>
       </p:sp>
@@ -5602,7 +5523,7 @@
 </p:sld>
 </file>
 
-<file path=ppt/slides/slide4.xml><?xml version="1.0" encoding="utf-8"?>
+<file path=ppt/slides/slide5.xml><?xml version="1.0" encoding="utf-8"?>
 <p:sld xmlns:a="http://schemas.openxmlformats.org/drawingml/2006/main" xmlns:r="http://schemas.openxmlformats.org/officeDocument/2006/relationships" xmlns:p="http://schemas.openxmlformats.org/presentationml/2006/main">
   <p:cSld>
     <p:spTree>
@@ -6155,7 +6076,7 @@
 </p:sld>
 </file>
 
-<file path=ppt/slides/slide5.xml><?xml version="1.0" encoding="utf-8"?>
+<file path=ppt/slides/slide6.xml><?xml version="1.0" encoding="utf-8"?>
 <p:sld xmlns:a="http://schemas.openxmlformats.org/drawingml/2006/main" xmlns:r="http://schemas.openxmlformats.org/officeDocument/2006/relationships" xmlns:p="http://schemas.openxmlformats.org/presentationml/2006/main">
   <p:cSld>
     <p:spTree>

</xml_diff>